<commit_message>
simplify notation - shap
</commit_message>
<xml_diff>
--- a/images/shap/figures.pptx
+++ b/images/shap/figures.pptx
@@ -104,6 +104,11 @@
       </a:defRPr>
     </a:lvl9pPr>
   </p:defaultTextStyle>
+  <p:extLst>
+    <p:ext uri="{EFAFB233-063F-42B5-8137-9DF3F51BA10A}">
+      <p15:sldGuideLst xmlns:p15="http://schemas.microsoft.com/office/powerpoint/2012/main"/>
+    </p:ext>
+  </p:extLst>
 </p:presentation>
 </file>
 
@@ -3540,7 +3545,7 @@
             <p:spPr>
               <a:xfrm>
                 <a:off x="4210234" y="2695345"/>
-                <a:ext cx="5180393" cy="717248"/>
+                <a:ext cx="5205336" cy="712567"/>
               </a:xfrm>
               <a:prstGeom prst="rect">
                 <a:avLst/>
@@ -3553,6 +3558,7 @@
               </a:bodyPr>
               <a:lstStyle/>
               <a:p>
+                <a:pPr/>
                 <a14:m>
                   <m:oMathPara xmlns:m="http://schemas.openxmlformats.org/officeDocument/2006/math">
                     <m:oMathParaPr>
@@ -3847,59 +3853,40 @@
                                   </m:ctrlPr>
                                 </m:dPr>
                                 <m:e>
-                                  <m:sSub>
-                                    <m:sSubPr>
+                                  <m:r>
+                                    <a:rPr lang="en-US" i="1">
+                                      <a:latin typeface="Cambria Math" panose="02040503050406030204" pitchFamily="18" charset="0"/>
+                                    </a:rPr>
+                                    <m:t>𝑆</m:t>
+                                  </m:r>
+                                  <m:r>
+                                    <a:rPr lang="en-US" i="1">
+                                      <a:latin typeface="Cambria Math" panose="02040503050406030204" pitchFamily="18" charset="0"/>
+                                      <a:ea typeface="Cambria Math" panose="02040503050406030204" pitchFamily="18" charset="0"/>
+                                    </a:rPr>
+                                    <m:t>∪</m:t>
+                                  </m:r>
+                                  <m:d>
+                                    <m:dPr>
+                                      <m:begChr m:val="{"/>
+                                      <m:endChr m:val="}"/>
                                       <m:ctrlPr>
-                                        <a:rPr lang="en-US" b="0" i="1" smtClean="0">
-                                          <a:latin typeface="Cambria Math" panose="02040503050406030204" pitchFamily="18" charset="0"/>
-                                        </a:rPr>
-                                      </m:ctrlPr>
-                                    </m:sSubPr>
-                                    <m:e>
-                                      <m:r>
-                                        <a:rPr lang="en-US" b="0" i="1" smtClean="0">
-                                          <a:latin typeface="Cambria Math" panose="02040503050406030204" pitchFamily="18" charset="0"/>
-                                        </a:rPr>
-                                        <m:t>𝑥</m:t>
-                                      </m:r>
-                                    </m:e>
-                                    <m:sub>
-                                      <m:r>
-                                        <a:rPr lang="en-US" b="0" i="1" smtClean="0">
-                                          <a:latin typeface="Cambria Math" panose="02040503050406030204" pitchFamily="18" charset="0"/>
-                                        </a:rPr>
-                                        <m:t>𝑆</m:t>
-                                      </m:r>
-                                      <m:r>
-                                        <a:rPr lang="en-US" b="0" i="1" smtClean="0">
+                                        <a:rPr lang="en-US" i="1">
                                           <a:latin typeface="Cambria Math" panose="02040503050406030204" pitchFamily="18" charset="0"/>
                                           <a:ea typeface="Cambria Math" panose="02040503050406030204" pitchFamily="18" charset="0"/>
                                         </a:rPr>
-                                        <m:t>∪</m:t>
+                                      </m:ctrlPr>
+                                    </m:dPr>
+                                    <m:e>
+                                      <m:r>
+                                        <a:rPr lang="en-US" i="1">
+                                          <a:latin typeface="Cambria Math" panose="02040503050406030204" pitchFamily="18" charset="0"/>
+                                          <a:ea typeface="Cambria Math" panose="02040503050406030204" pitchFamily="18" charset="0"/>
+                                        </a:rPr>
+                                        <m:t>𝐴</m:t>
                                       </m:r>
-                                      <m:d>
-                                        <m:dPr>
-                                          <m:begChr m:val="{"/>
-                                          <m:endChr m:val="}"/>
-                                          <m:ctrlPr>
-                                            <a:rPr lang="en-US" b="0" i="1" smtClean="0">
-                                              <a:latin typeface="Cambria Math" panose="02040503050406030204" pitchFamily="18" charset="0"/>
-                                              <a:ea typeface="Cambria Math" panose="02040503050406030204" pitchFamily="18" charset="0"/>
-                                            </a:rPr>
-                                          </m:ctrlPr>
-                                        </m:dPr>
-                                        <m:e>
-                                          <m:r>
-                                            <a:rPr lang="en-US" b="0" i="1" smtClean="0">
-                                              <a:latin typeface="Cambria Math" panose="02040503050406030204" pitchFamily="18" charset="0"/>
-                                              <a:ea typeface="Cambria Math" panose="02040503050406030204" pitchFamily="18" charset="0"/>
-                                            </a:rPr>
-                                            <m:t>𝐴</m:t>
-                                          </m:r>
-                                        </m:e>
-                                      </m:d>
-                                    </m:sub>
-                                  </m:sSub>
+                                    </m:e>
+                                  </m:d>
                                 </m:e>
                               </m:d>
                               <m:r>
@@ -3920,31 +3907,12 @@
                                 </a:rPr>
                                 <m:t>(</m:t>
                               </m:r>
-                              <m:sSub>
-                                <m:sSubPr>
-                                  <m:ctrlPr>
-                                    <a:rPr lang="en-US" b="0" i="1" smtClean="0">
-                                      <a:latin typeface="Cambria Math" panose="02040503050406030204" pitchFamily="18" charset="0"/>
-                                    </a:rPr>
-                                  </m:ctrlPr>
-                                </m:sSubPr>
-                                <m:e>
-                                  <m:r>
-                                    <a:rPr lang="en-US" b="0" i="1" smtClean="0">
-                                      <a:latin typeface="Cambria Math" panose="02040503050406030204" pitchFamily="18" charset="0"/>
-                                    </a:rPr>
-                                    <m:t>𝑥</m:t>
-                                  </m:r>
-                                </m:e>
-                                <m:sub>
-                                  <m:r>
-                                    <a:rPr lang="en-US" b="0" i="1" smtClean="0">
-                                      <a:latin typeface="Cambria Math" panose="02040503050406030204" pitchFamily="18" charset="0"/>
-                                    </a:rPr>
-                                    <m:t>𝑆</m:t>
-                                  </m:r>
-                                </m:sub>
-                              </m:sSub>
+                              <m:r>
+                                <a:rPr lang="en-US" b="0" i="1" smtClean="0">
+                                  <a:latin typeface="Cambria Math" panose="02040503050406030204" pitchFamily="18" charset="0"/>
+                                </a:rPr>
+                                <m:t>𝑆</m:t>
+                              </m:r>
                               <m:r>
                                 <a:rPr lang="en-US" b="0" i="1" smtClean="0">
                                   <a:latin typeface="Cambria Math" panose="02040503050406030204" pitchFamily="18" charset="0"/>
@@ -3981,7 +3949,7 @@
             <p:spPr>
               <a:xfrm>
                 <a:off x="4210234" y="2695345"/>
-                <a:ext cx="5180393" cy="717248"/>
+                <a:ext cx="5205336" cy="712567"/>
               </a:xfrm>
               <a:prstGeom prst="rect">
                 <a:avLst/>
@@ -3989,7 +3957,7 @@
               <a:blipFill>
                 <a:blip r:embed="rId2"/>
                 <a:stretch>
-                  <a:fillRect l="-1225" t="-132759" b="-179310"/>
+                  <a:fillRect l="-1220" t="-135088" b="-184211"/>
                 </a:stretch>
               </a:blipFill>
             </p:spPr>

</xml_diff>

<commit_message>
shap - correct equation error
</commit_message>
<xml_diff>
--- a/images/shap/figures.pptx
+++ b/images/shap/figures.pptx
@@ -3528,8 +3528,8 @@
           </a:p>
         </p:txBody>
       </p:sp>
-      <mc:AlternateContent xmlns:mc="http://schemas.openxmlformats.org/markup-compatibility/2006">
-        <mc:Choice xmlns:a14="http://schemas.microsoft.com/office/drawing/2010/main" Requires="a14">
+      <mc:AlternateContent xmlns:mc="http://schemas.openxmlformats.org/markup-compatibility/2006" xmlns:a14="http://schemas.microsoft.com/office/drawing/2010/main">
+        <mc:Choice Requires="a14">
           <p:sp>
             <p:nvSpPr>
               <p:cNvPr id="6" name="TextBox 5">
@@ -3931,7 +3931,7 @@
             </p:txBody>
           </p:sp>
         </mc:Choice>
-        <mc:Fallback>
+        <mc:Fallback xmlns="">
           <p:sp>
             <p:nvSpPr>
               <p:cNvPr id="6" name="TextBox 5">
@@ -4681,8 +4681,8 @@
         </p:nvSpPr>
         <p:spPr>
           <a:xfrm>
-            <a:off x="7241249" y="3893795"/>
-            <a:ext cx="1134477" cy="738664"/>
+            <a:off x="7304567" y="3893795"/>
+            <a:ext cx="1007841" cy="738664"/>
           </a:xfrm>
           <a:prstGeom prst="rect">
             <a:avLst/>
@@ -4719,7 +4719,7 @@
                   </a:schemeClr>
                 </a:solidFill>
               </a:rPr>
-              <a:t>value before </a:t>
+              <a:t>value after </a:t>
             </a:r>
           </a:p>
           <a:p>
@@ -4752,8 +4752,8 @@
         </p:nvSpPr>
         <p:spPr>
           <a:xfrm>
-            <a:off x="8457381" y="3893795"/>
-            <a:ext cx="1007841" cy="738664"/>
+            <a:off x="8394063" y="3893795"/>
+            <a:ext cx="1134478" cy="738664"/>
           </a:xfrm>
           <a:prstGeom prst="rect">
             <a:avLst/>
@@ -4790,7 +4790,7 @@
                   </a:schemeClr>
                 </a:solidFill>
               </a:rPr>
-              <a:t>value after </a:t>
+              <a:t>value before </a:t>
             </a:r>
           </a:p>
           <a:p>

</xml_diff>